<commit_message>
Update More Details About API's.pptx
</commit_message>
<xml_diff>
--- a/tutorial6/More Details About API's.pptx
+++ b/tutorial6/More Details About API's.pptx
@@ -8,12 +8,11 @@
     <p:sldId id="256" r:id="rId2"/>
     <p:sldId id="257" r:id="rId3"/>
     <p:sldId id="258" r:id="rId4"/>
-    <p:sldId id="259" r:id="rId5"/>
-    <p:sldId id="264" r:id="rId6"/>
-    <p:sldId id="260" r:id="rId7"/>
-    <p:sldId id="263" r:id="rId8"/>
-    <p:sldId id="261" r:id="rId9"/>
-    <p:sldId id="262" r:id="rId10"/>
+    <p:sldId id="264" r:id="rId5"/>
+    <p:sldId id="260" r:id="rId6"/>
+    <p:sldId id="263" r:id="rId7"/>
+    <p:sldId id="261" r:id="rId8"/>
+    <p:sldId id="262" r:id="rId9"/>
   </p:sldIdLst>
   <p:sldSz cx="12192000" cy="6858000"/>
   <p:notesSz cx="6858000" cy="9144000"/>
@@ -112,6 +111,11 @@
       </a:defRPr>
     </a:lvl9pPr>
   </p:defaultTextStyle>
+  <p:extLst>
+    <p:ext uri="{EFAFB233-063F-42B5-8137-9DF3F51BA10A}">
+      <p15:sldGuideLst xmlns:p15="http://schemas.microsoft.com/office/powerpoint/2012/main"/>
+    </p:ext>
+  </p:extLst>
 </p:presentation>
 </file>
 
@@ -2462,7 +2466,7 @@
           <a:p>
             <a:fld id="{3C04E684-10F4-4CC3-A0B9-F03AA7BE37CF}" type="datetimeFigureOut">
               <a:rPr lang="en-US" smtClean="0"/>
-              <a:t>4/23/21</a:t>
+              <a:t>4/23/2021</a:t>
             </a:fld>
             <a:endParaRPr lang="en-US"/>
           </a:p>
@@ -4952,7 +4956,7 @@
           <a:p>
             <a:fld id="{3C04E684-10F4-4CC3-A0B9-F03AA7BE37CF}" type="datetimeFigureOut">
               <a:rPr lang="en-US" smtClean="0"/>
-              <a:t>4/23/21</a:t>
+              <a:t>4/23/2021</a:t>
             </a:fld>
             <a:endParaRPr lang="en-US"/>
           </a:p>
@@ -5150,7 +5154,7 @@
           <a:p>
             <a:fld id="{3C04E684-10F4-4CC3-A0B9-F03AA7BE37CF}" type="datetimeFigureOut">
               <a:rPr lang="en-US" smtClean="0"/>
-              <a:t>4/23/21</a:t>
+              <a:t>4/23/2021</a:t>
             </a:fld>
             <a:endParaRPr lang="en-US"/>
           </a:p>
@@ -5358,7 +5362,7 @@
           <a:p>
             <a:fld id="{3C04E684-10F4-4CC3-A0B9-F03AA7BE37CF}" type="datetimeFigureOut">
               <a:rPr lang="en-US" smtClean="0"/>
-              <a:t>4/23/21</a:t>
+              <a:t>4/23/2021</a:t>
             </a:fld>
             <a:endParaRPr lang="en-US"/>
           </a:p>
@@ -6095,7 +6099,7 @@
           <a:p>
             <a:fld id="{3C04E684-10F4-4CC3-A0B9-F03AA7BE37CF}" type="datetimeFigureOut">
               <a:rPr lang="en-US" smtClean="0"/>
-              <a:t>4/23/21</a:t>
+              <a:t>4/23/2021</a:t>
             </a:fld>
             <a:endParaRPr lang="en-US"/>
           </a:p>
@@ -6737,7 +6741,7 @@
           <a:p>
             <a:fld id="{3C04E684-10F4-4CC3-A0B9-F03AA7BE37CF}" type="datetimeFigureOut">
               <a:rPr lang="en-US" smtClean="0"/>
-              <a:t>4/23/21</a:t>
+              <a:t>4/23/2021</a:t>
             </a:fld>
             <a:endParaRPr lang="en-US"/>
           </a:p>
@@ -7537,7 +7541,7 @@
           <a:p>
             <a:fld id="{3C04E684-10F4-4CC3-A0B9-F03AA7BE37CF}" type="datetimeFigureOut">
               <a:rPr lang="en-US" smtClean="0"/>
-              <a:t>4/23/21</a:t>
+              <a:t>4/23/2021</a:t>
             </a:fld>
             <a:endParaRPr lang="en-US"/>
           </a:p>
@@ -8488,7 +8492,7 @@
           <a:p>
             <a:fld id="{3C04E684-10F4-4CC3-A0B9-F03AA7BE37CF}" type="datetimeFigureOut">
               <a:rPr lang="en-US" smtClean="0"/>
-              <a:t>4/23/21</a:t>
+              <a:t>4/23/2021</a:t>
             </a:fld>
             <a:endParaRPr lang="en-US"/>
           </a:p>
@@ -10837,7 +10841,7 @@
           <a:p>
             <a:fld id="{3C04E684-10F4-4CC3-A0B9-F03AA7BE37CF}" type="datetimeFigureOut">
               <a:rPr lang="en-US" smtClean="0"/>
-              <a:t>4/23/21</a:t>
+              <a:t>4/23/2021</a:t>
             </a:fld>
             <a:endParaRPr lang="en-US"/>
           </a:p>
@@ -10950,7 +10954,7 @@
           <a:p>
             <a:fld id="{3C04E684-10F4-4CC3-A0B9-F03AA7BE37CF}" type="datetimeFigureOut">
               <a:rPr lang="en-US" smtClean="0"/>
-              <a:t>4/23/21</a:t>
+              <a:t>4/23/2021</a:t>
             </a:fld>
             <a:endParaRPr lang="en-US"/>
           </a:p>
@@ -11457,7 +11461,7 @@
           <a:p>
             <a:fld id="{3C04E684-10F4-4CC3-A0B9-F03AA7BE37CF}" type="datetimeFigureOut">
               <a:rPr lang="en-US" smtClean="0"/>
-              <a:t>4/23/21</a:t>
+              <a:t>4/23/2021</a:t>
             </a:fld>
             <a:endParaRPr lang="en-US"/>
           </a:p>
@@ -12760,7 +12764,7 @@
           <a:p>
             <a:fld id="{3C04E684-10F4-4CC3-A0B9-F03AA7BE37CF}" type="datetimeFigureOut">
               <a:rPr lang="en-US" smtClean="0"/>
-              <a:t>4/23/21</a:t>
+              <a:t>4/23/2021</a:t>
             </a:fld>
             <a:endParaRPr lang="en-US"/>
           </a:p>
@@ -13007,7 +13011,7 @@
           <a:p>
             <a:fld id="{3C04E684-10F4-4CC3-A0B9-F03AA7BE37CF}" type="datetimeFigureOut">
               <a:rPr lang="en-US" smtClean="0"/>
-              <a:t>4/23/21</a:t>
+              <a:t>4/23/2021</a:t>
             </a:fld>
             <a:endParaRPr lang="en-US"/>
           </a:p>
@@ -13493,35 +13497,6 @@
           </a:p>
         </p:txBody>
       </p:sp>
-      <p:pic>
-        <p:nvPicPr>
-          <p:cNvPr id="48" name="Picture 3" descr="Colorful 3D rendering of triangles">
-            <a:extLst>
-              <a:ext uri="{FF2B5EF4-FFF2-40B4-BE49-F238E27FC236}">
-                <a16:creationId xmlns:a16="http://schemas.microsoft.com/office/drawing/2014/main" id="{2062FC92-0429-4DFC-A7A3-F4295376EB00}"/>
-              </a:ext>
-            </a:extLst>
-          </p:cNvPr>
-          <p:cNvPicPr>
-            <a:picLocks noChangeAspect="1"/>
-          </p:cNvPicPr>
-          <p:nvPr/>
-        </p:nvPicPr>
-        <p:blipFill rotWithShape="1">
-          <a:blip r:embed="rId2"/>
-          <a:srcRect t="13444" b="2286"/>
-          <a:stretch/>
-        </p:blipFill>
-        <p:spPr>
-          <a:xfrm>
-            <a:off x="20" y="0"/>
-            <a:ext cx="12191980" cy="6857990"/>
-          </a:xfrm>
-          <a:prstGeom prst="rect">
-            <a:avLst/>
-          </a:prstGeom>
-        </p:spPr>
-      </p:pic>
       <p:sp>
         <p:nvSpPr>
           <p:cNvPr id="29" name="Graphic 1">
@@ -16607,7 +16582,7 @@
           <a:p>
             <a:r>
               <a:rPr lang="en-US" dirty="0"/>
-              <a:t>When a client makes an HTTP request to a server, the server sends bake an HTTP response. </a:t>
+              <a:t>When a client makes an HTTP request to a server, the server sends back an HTTP response. </a:t>
             </a:r>
           </a:p>
           <a:p>
@@ -16676,122 +16651,6 @@
 </file>
 
 <file path=ppt/slides/slide4.xml><?xml version="1.0" encoding="utf-8"?>
-<p:sld xmlns:a="http://schemas.openxmlformats.org/drawingml/2006/main" xmlns:r="http://schemas.openxmlformats.org/officeDocument/2006/relationships" xmlns:p="http://schemas.openxmlformats.org/presentationml/2006/main">
-  <p:cSld>
-    <p:spTree>
-      <p:nvGrpSpPr>
-        <p:cNvPr id="1" name=""/>
-        <p:cNvGrpSpPr/>
-        <p:nvPr/>
-      </p:nvGrpSpPr>
-      <p:grpSpPr>
-        <a:xfrm>
-          <a:off x="0" y="0"/>
-          <a:ext cx="0" cy="0"/>
-          <a:chOff x="0" y="0"/>
-          <a:chExt cx="0" cy="0"/>
-        </a:xfrm>
-      </p:grpSpPr>
-      <p:sp>
-        <p:nvSpPr>
-          <p:cNvPr id="2" name="Title 1">
-            <a:extLst>
-              <a:ext uri="{FF2B5EF4-FFF2-40B4-BE49-F238E27FC236}">
-                <a16:creationId xmlns:a16="http://schemas.microsoft.com/office/drawing/2014/main" id="{91E8DC92-8182-EC40-9110-341A0D11B012}"/>
-              </a:ext>
-            </a:extLst>
-          </p:cNvPr>
-          <p:cNvSpPr>
-            <a:spLocks noGrp="1"/>
-          </p:cNvSpPr>
-          <p:nvPr>
-            <p:ph type="title"/>
-          </p:nvPr>
-        </p:nvSpPr>
-        <p:spPr/>
-        <p:txBody>
-          <a:bodyPr/>
-          <a:lstStyle/>
-          <a:p>
-            <a:r>
-              <a:rPr lang="en-US" dirty="0"/>
-              <a:t>HTTP Request</a:t>
-            </a:r>
-          </a:p>
-        </p:txBody>
-      </p:sp>
-      <p:sp>
-        <p:nvSpPr>
-          <p:cNvPr id="3" name="Content Placeholder 2">
-            <a:extLst>
-              <a:ext uri="{FF2B5EF4-FFF2-40B4-BE49-F238E27FC236}">
-                <a16:creationId xmlns:a16="http://schemas.microsoft.com/office/drawing/2014/main" id="{65D1A7C5-411E-984E-BA01-856C7B736BE7}"/>
-              </a:ext>
-            </a:extLst>
-          </p:cNvPr>
-          <p:cNvSpPr>
-            <a:spLocks noGrp="1"/>
-          </p:cNvSpPr>
-          <p:nvPr>
-            <p:ph idx="1"/>
-          </p:nvPr>
-        </p:nvSpPr>
-        <p:spPr/>
-        <p:txBody>
-          <a:bodyPr/>
-          <a:lstStyle/>
-          <a:p>
-            <a:r>
-              <a:rPr lang="en-US" dirty="0"/>
-              <a:t>Made up of 4 parts: url, method, list of headers, body</a:t>
-            </a:r>
-          </a:p>
-          <a:p>
-            <a:r>
-              <a:rPr lang="en-US" dirty="0"/>
-              <a:t>URL is the unique address for an item on the web</a:t>
-            </a:r>
-          </a:p>
-          <a:p>
-            <a:r>
-              <a:rPr lang="en-US" dirty="0"/>
-              <a:t>Methods: Get, put, post, delete</a:t>
-            </a:r>
-          </a:p>
-          <a:p>
-            <a:r>
-              <a:rPr lang="en-US" dirty="0"/>
-              <a:t>Headers is a summarization of what we are trying to do</a:t>
-            </a:r>
-          </a:p>
-          <a:p>
-            <a:r>
-              <a:rPr lang="en-US" dirty="0"/>
-              <a:t>Body contains the list of information that we want to send the server</a:t>
-            </a:r>
-          </a:p>
-          <a:p>
-            <a:endParaRPr lang="en-US" dirty="0"/>
-          </a:p>
-          <a:p>
-            <a:endParaRPr lang="en-US" dirty="0"/>
-          </a:p>
-        </p:txBody>
-      </p:sp>
-    </p:spTree>
-    <p:extLst>
-      <p:ext uri="{BB962C8B-B14F-4D97-AF65-F5344CB8AC3E}">
-        <p14:creationId xmlns:p14="http://schemas.microsoft.com/office/powerpoint/2010/main" val="874029093"/>
-      </p:ext>
-    </p:extLst>
-  </p:cSld>
-  <p:clrMapOvr>
-    <a:masterClrMapping/>
-  </p:clrMapOvr>
-</p:sld>
-</file>
-
-<file path=ppt/slides/slide5.xml><?xml version="1.0" encoding="utf-8"?>
 <p:sld xmlns:a="http://schemas.openxmlformats.org/drawingml/2006/main" xmlns:r="http://schemas.openxmlformats.org/officeDocument/2006/relationships" xmlns:p="http://schemas.openxmlformats.org/presentationml/2006/main">
   <p:cSld>
     <p:spTree>
@@ -16892,7 +16751,7 @@
 </p:sld>
 </file>
 
-<file path=ppt/slides/slide6.xml><?xml version="1.0" encoding="utf-8"?>
+<file path=ppt/slides/slide5.xml><?xml version="1.0" encoding="utf-8"?>
 <p:sld xmlns:a="http://schemas.openxmlformats.org/drawingml/2006/main" xmlns:r="http://schemas.openxmlformats.org/officeDocument/2006/relationships" xmlns:p="http://schemas.openxmlformats.org/presentationml/2006/main">
   <p:cSld>
     <p:spTree>
@@ -16982,7 +16841,7 @@
 </p:sld>
 </file>
 
-<file path=ppt/slides/slide7.xml><?xml version="1.0" encoding="utf-8"?>
+<file path=ppt/slides/slide6.xml><?xml version="1.0" encoding="utf-8"?>
 <p:sld xmlns:a="http://schemas.openxmlformats.org/drawingml/2006/main" xmlns:r="http://schemas.openxmlformats.org/officeDocument/2006/relationships" xmlns:p="http://schemas.openxmlformats.org/presentationml/2006/main">
   <p:cSld>
     <p:spTree>
@@ -17127,7 +16986,7 @@
 </p:sld>
 </file>
 
-<file path=ppt/slides/slide8.xml><?xml version="1.0" encoding="utf-8"?>
+<file path=ppt/slides/slide7.xml><?xml version="1.0" encoding="utf-8"?>
 <p:sld xmlns:a="http://schemas.openxmlformats.org/drawingml/2006/main" xmlns:r="http://schemas.openxmlformats.org/officeDocument/2006/relationships" xmlns:p="http://schemas.openxmlformats.org/presentationml/2006/main">
   <p:cSld>
     <p:spTree>
@@ -17249,7 +17108,7 @@
 </p:sld>
 </file>
 
-<file path=ppt/slides/slide9.xml><?xml version="1.0" encoding="utf-8"?>
+<file path=ppt/slides/slide8.xml><?xml version="1.0" encoding="utf-8"?>
 <p:sld xmlns:a="http://schemas.openxmlformats.org/drawingml/2006/main" xmlns:r="http://schemas.openxmlformats.org/officeDocument/2006/relationships" xmlns:p="http://schemas.openxmlformats.org/presentationml/2006/main">
   <p:cSld>
     <p:spTree>

</xml_diff>